<commit_message>
add diagrams to teamdisplay and playerdetails
</commit_message>
<xml_diff>
--- a/docs/diagrams/PlayerDetailsDiagram.pptx
+++ b/docs/diagrams/PlayerDetailsDiagram.pptx
@@ -4167,7 +4167,7 @@
         <p:spPr>
           <a:xfrm>
             <a:off x="422824" y="1515710"/>
-            <a:ext cx="1087487" cy="430887"/>
+            <a:ext cx="1087487" cy="215444"/>
           </a:xfrm>
           <a:prstGeom prst="rect">
             <a:avLst/>
@@ -4182,11 +4182,11 @@
           <a:p>
             <a:r>
               <a:rPr lang="en-US" sz="1400" dirty="0"/>
-              <a:t>r</a:t>
+              <a:t>c</a:t>
             </a:r>
             <a:r>
               <a:rPr lang="en-US" sz="1400" dirty="0" smtClean="0"/>
-              <a:t>emark 1 r/test</a:t>
+              <a:t>reate Team</a:t>
             </a:r>
             <a:endParaRPr lang="en-US" sz="1400" dirty="0"/>
           </a:p>
@@ -4264,7 +4264,7 @@
                   <a:srgbClr val="0070C0"/>
                 </a:solidFill>
               </a:rPr>
-              <a:t>(“remark 1 r/test”)</a:t>
+              <a:t>(“create Team”)</a:t>
             </a:r>
             <a:endParaRPr lang="en-US" sz="1400" dirty="0">
               <a:solidFill>
@@ -4333,12 +4333,20 @@
           <a:lstStyle/>
           <a:p>
             <a:r>
+              <a:rPr lang="en-US" sz="1400" dirty="0" err="1" smtClean="0">
+                <a:solidFill>
+                  <a:srgbClr val="7030A0"/>
+                </a:solidFill>
+              </a:rPr>
+              <a:t>createTeam</a:t>
+            </a:r>
+            <a:r>
               <a:rPr lang="en-US" sz="1400" dirty="0" smtClean="0">
                 <a:solidFill>
                   <a:srgbClr val="7030A0"/>
                 </a:solidFill>
               </a:rPr>
-              <a:t>updatePerson()</a:t>
+              <a:t>()</a:t>
             </a:r>
             <a:endParaRPr lang="en-US" sz="1400" dirty="0">
               <a:solidFill>
@@ -4381,7 +4389,7 @@
               <a:t>post(</a:t>
             </a:r>
             <a:r>
-              <a:rPr lang="en-US" sz="1400" dirty="0">
+              <a:rPr lang="en-US" sz="1400" dirty="0" smtClean="0">
                 <a:solidFill>
                   <a:schemeClr val="accent5">
                     <a:lumMod val="75000"/>
@@ -4819,7 +4827,7 @@
           <a:lstStyle/>
           <a:p>
             <a:r>
-              <a:rPr lang="en-US" sz="1400" dirty="0">
+              <a:rPr lang="en-US" sz="1400" dirty="0" smtClean="0">
                 <a:solidFill>
                   <a:srgbClr val="92D050"/>
                 </a:solidFill>

</xml_diff>